<commit_message>
PPT of Real Estate Exploratory Data Analysis (EDA)
I am trying to present the project which go through Exploratory Data Analysis techniques, our main focus to gain insights into various factors influencing house prices.
</commit_message>
<xml_diff>
--- a/Exploring Real Estate Valuation Dynamics.pptx
+++ b/Exploring Real Estate Valuation Dynamics.pptx
@@ -11,12 +11,16 @@
     <p:sldId id="259" r:id="rId5"/>
     <p:sldId id="260" r:id="rId6"/>
     <p:sldId id="261" r:id="rId7"/>
-    <p:sldId id="262" r:id="rId8"/>
-    <p:sldId id="263" r:id="rId9"/>
-    <p:sldId id="264" r:id="rId10"/>
-    <p:sldId id="265" r:id="rId11"/>
-    <p:sldId id="266" r:id="rId12"/>
-    <p:sldId id="267" r:id="rId13"/>
+    <p:sldId id="268" r:id="rId8"/>
+    <p:sldId id="269" r:id="rId9"/>
+    <p:sldId id="262" r:id="rId10"/>
+    <p:sldId id="263" r:id="rId11"/>
+    <p:sldId id="264" r:id="rId12"/>
+    <p:sldId id="265" r:id="rId13"/>
+    <p:sldId id="266" r:id="rId14"/>
+    <p:sldId id="271" r:id="rId15"/>
+    <p:sldId id="270" r:id="rId16"/>
+    <p:sldId id="267" r:id="rId17"/>
   </p:sldIdLst>
   <p:sldSz cx="9144000" cy="6858000" type="screen4x3"/>
   <p:notesSz cx="6858000" cy="9144000"/>
@@ -6150,14 +6154,14 @@
           <a:lstStyle/>
           <a:p>
             <a:r>
-              <a:rPr lang="en-GB" dirty="0"/>
-              <a:t>Feature Engineering and Size </a:t>
-            </a:r>
-            <a:r>
-              <a:rPr lang="en-GB" dirty="0" smtClean="0"/>
-              <a:t>Impact</a:t>
-            </a:r>
-            <a:endParaRPr lang="en-GB" dirty="0"/>
+              <a:rPr lang="en-GB" sz="3200" dirty="0"/>
+              <a:t>Multivariate </a:t>
+            </a:r>
+            <a:r>
+              <a:rPr lang="en-GB" sz="3200" dirty="0" smtClean="0"/>
+              <a:t>Analysis</a:t>
+            </a:r>
+            <a:endParaRPr lang="en-GB" sz="3200" dirty="0"/>
           </a:p>
         </p:txBody>
       </p:sp>
@@ -6173,22 +6177,68 @@
         </p:nvSpPr>
         <p:spPr/>
         <p:txBody>
-          <a:bodyPr/>
-          <a:lstStyle/>
-          <a:p>
-            <a:r>
-              <a:rPr lang="en-GB" dirty="0"/>
-              <a:t>Scatterplot for house prices vs. square footage</a:t>
-            </a:r>
-          </a:p>
-          <a:p>
-            <a:endParaRPr lang="en-GB" dirty="0"/>
+          <a:bodyPr>
+            <a:normAutofit/>
+          </a:bodyPr>
+          <a:lstStyle/>
+          <a:p>
+            <a:r>
+              <a:rPr lang="en-GB" sz="2000" dirty="0" smtClean="0"/>
+              <a:t>Scatterplot </a:t>
+            </a:r>
+            <a:r>
+              <a:rPr lang="en-GB" sz="2000" dirty="0"/>
+              <a:t>matrix for selected </a:t>
+            </a:r>
+            <a:r>
+              <a:rPr lang="en-GB" sz="2000" dirty="0" smtClean="0"/>
+              <a:t>features:- </a:t>
+            </a:r>
+            <a:r>
+              <a:rPr lang="en-GB" sz="2000" dirty="0"/>
+              <a:t>'</a:t>
+            </a:r>
+            <a:r>
+              <a:rPr lang="en-GB" sz="2000" dirty="0" err="1"/>
+              <a:t>SalePrice</a:t>
+            </a:r>
+            <a:r>
+              <a:rPr lang="en-GB" sz="2000" dirty="0"/>
+              <a:t>', '</a:t>
+            </a:r>
+            <a:r>
+              <a:rPr lang="en-GB" sz="2000" dirty="0" err="1"/>
+              <a:t>GarageArea</a:t>
+            </a:r>
+            <a:r>
+              <a:rPr lang="en-GB" sz="2000" dirty="0"/>
+              <a:t>', '</a:t>
+            </a:r>
+            <a:r>
+              <a:rPr lang="en-GB" sz="2000" dirty="0" err="1"/>
+              <a:t>TotRmsAbvGrd</a:t>
+            </a:r>
+            <a:r>
+              <a:rPr lang="en-GB" sz="2000" dirty="0"/>
+              <a:t>', '</a:t>
+            </a:r>
+            <a:r>
+              <a:rPr lang="en-GB" sz="2000" dirty="0" err="1"/>
+              <a:t>GrLivArea</a:t>
+            </a:r>
+            <a:r>
+              <a:rPr lang="en-GB" sz="2000" dirty="0"/>
+              <a:t>'</a:t>
+            </a:r>
+          </a:p>
+          <a:p>
+            <a:endParaRPr lang="en-GB" sz="2000" dirty="0"/>
           </a:p>
         </p:txBody>
       </p:sp>
       <p:pic>
         <p:nvPicPr>
-          <p:cNvPr id="4098" name="Picture 2"/>
+          <p:cNvPr id="1026" name="Picture 2"/>
           <p:cNvPicPr>
             <a:picLocks noChangeAspect="1" noChangeArrowheads="1"/>
           </p:cNvPicPr>
@@ -6209,8 +6259,8 @@
         </p:blipFill>
         <p:spPr bwMode="auto">
           <a:xfrm>
-            <a:off x="683568" y="2117722"/>
-            <a:ext cx="6624736" cy="2933771"/>
+            <a:off x="323528" y="2276872"/>
+            <a:ext cx="8280920" cy="4248472"/>
           </a:xfrm>
           <a:prstGeom prst="rect">
             <a:avLst/>
@@ -6253,7 +6303,7 @@
     </p:spTree>
     <p:extLst>
       <p:ext uri="{BB962C8B-B14F-4D97-AF65-F5344CB8AC3E}">
-        <p14:creationId xmlns:p14="http://schemas.microsoft.com/office/powerpoint/2010/main" val="2995126685"/>
+        <p14:creationId xmlns:p14="http://schemas.microsoft.com/office/powerpoint/2010/main" val="4049109071"/>
       </p:ext>
     </p:extLst>
   </p:cSld>
@@ -6300,27 +6350,27 @@
         <p:spPr/>
         <p:txBody>
           <a:bodyPr>
-            <a:noAutofit/>
+            <a:normAutofit/>
           </a:bodyPr>
           <a:lstStyle/>
           <a:p>
             <a:r>
-              <a:rPr lang="en-GB" sz="2400" dirty="0"/>
-              <a:t>Market </a:t>
-            </a:r>
-            <a:r>
-              <a:rPr lang="en-GB" sz="2400" dirty="0" smtClean="0"/>
-              <a:t>Trends, Historical Pricing, </a:t>
-            </a:r>
-            <a:r>
-              <a:rPr lang="en-GB" sz="2400" dirty="0"/>
-              <a:t>Customer Preferences and </a:t>
-            </a:r>
-            <a:r>
-              <a:rPr lang="en-GB" sz="2400" dirty="0" smtClean="0"/>
-              <a:t>Amenities</a:t>
-            </a:r>
-            <a:endParaRPr lang="en-GB" sz="2400" dirty="0"/>
+              <a:rPr lang="en-GB" sz="3000" dirty="0"/>
+              <a:t>Feature </a:t>
+            </a:r>
+            <a:r>
+              <a:rPr lang="en-GB" sz="3000" dirty="0" smtClean="0"/>
+              <a:t>Engineering and </a:t>
+            </a:r>
+            <a:r>
+              <a:rPr lang="en-GB" sz="3000" dirty="0"/>
+              <a:t>Geospatial </a:t>
+            </a:r>
+            <a:r>
+              <a:rPr lang="en-GB" sz="3000" dirty="0" smtClean="0"/>
+              <a:t>Analysis</a:t>
+            </a:r>
+            <a:endParaRPr lang="en-GB" sz="3000" dirty="0"/>
           </a:p>
         </p:txBody>
       </p:sp>
@@ -6340,42 +6390,156 @@
           <a:lstStyle/>
           <a:p>
             <a:r>
-              <a:rPr lang="en-GB" sz="2000" dirty="0"/>
-              <a:t>Line plot for historical pricing </a:t>
-            </a:r>
-            <a:r>
-              <a:rPr lang="en-GB" sz="2000" dirty="0" smtClean="0"/>
-              <a:t>trends.</a:t>
-            </a:r>
-          </a:p>
-          <a:p>
-            <a:endParaRPr lang="en-GB" sz="2000" dirty="0"/>
-          </a:p>
-          <a:p>
-            <a:endParaRPr lang="en-GB" sz="2000" dirty="0" smtClean="0"/>
-          </a:p>
-          <a:p>
-            <a:endParaRPr lang="en-GB" sz="2000" dirty="0"/>
-          </a:p>
-          <a:p>
-            <a:endParaRPr lang="en-GB" sz="2000" dirty="0" smtClean="0"/>
-          </a:p>
-          <a:p>
-            <a:endParaRPr lang="en-GB" sz="2000" dirty="0"/>
-          </a:p>
-          <a:p>
-            <a:r>
-              <a:rPr lang="en-GB" sz="2000" dirty="0"/>
-              <a:t>Boxplot for house prices with/without a </a:t>
-            </a:r>
-            <a:r>
-              <a:rPr lang="en-GB" sz="2000" dirty="0" err="1"/>
-              <a:t>GarageArea</a:t>
-            </a:r>
-            <a:endParaRPr lang="en-GB" sz="2000" dirty="0"/>
-          </a:p>
-          <a:p>
-            <a:endParaRPr lang="en-GB" sz="2000" dirty="0"/>
+              <a:rPr lang="en-GB" dirty="0"/>
+              <a:t>Create a new feature </a:t>
+            </a:r>
+            <a:r>
+              <a:rPr lang="en-GB" dirty="0" smtClean="0"/>
+              <a:t>“</a:t>
+            </a:r>
+            <a:r>
+              <a:rPr lang="en-GB" dirty="0" err="1" smtClean="0"/>
+              <a:t>price_per_sqft</a:t>
+            </a:r>
+            <a:r>
+              <a:rPr lang="en-GB" dirty="0" smtClean="0"/>
+              <a:t>” by using two feature data (</a:t>
+            </a:r>
+            <a:r>
+              <a:rPr lang="en-GB" dirty="0" err="1" smtClean="0"/>
+              <a:t>SalePrice</a:t>
+            </a:r>
+            <a:r>
+              <a:rPr lang="en-GB" dirty="0" smtClean="0"/>
+              <a:t> and </a:t>
+            </a:r>
+            <a:r>
+              <a:rPr lang="en-GB" dirty="0" err="1" smtClean="0"/>
+              <a:t>GrLivArea</a:t>
+            </a:r>
+            <a:r>
+              <a:rPr lang="en-GB" dirty="0" smtClean="0"/>
+              <a:t>).</a:t>
+            </a:r>
+          </a:p>
+          <a:p>
+            <a:pPr marL="0" indent="0">
+              <a:buNone/>
+            </a:pPr>
+            <a:endParaRPr lang="en-GB" dirty="0"/>
+          </a:p>
+          <a:p>
+            <a:pPr marL="0" indent="0">
+              <a:buNone/>
+            </a:pPr>
+            <a:endParaRPr lang="en-GB" dirty="0" smtClean="0"/>
+          </a:p>
+          <a:p>
+            <a:r>
+              <a:rPr lang="en-GB" dirty="0"/>
+              <a:t>Geospatial </a:t>
+            </a:r>
+            <a:r>
+              <a:rPr lang="en-GB" dirty="0" smtClean="0"/>
+              <a:t>Analysis:-  For this we need longitude and latitude so we can analysis the data accordingly. </a:t>
+            </a:r>
+          </a:p>
+          <a:p>
+            <a:endParaRPr lang="en-GB" dirty="0"/>
+          </a:p>
+          <a:p>
+            <a:endParaRPr lang="en-GB" dirty="0" smtClean="0"/>
+          </a:p>
+          <a:p>
+            <a:endParaRPr lang="en-GB" dirty="0"/>
+          </a:p>
+        </p:txBody>
+      </p:sp>
+    </p:spTree>
+    <p:extLst>
+      <p:ext uri="{BB962C8B-B14F-4D97-AF65-F5344CB8AC3E}">
+        <p14:creationId xmlns:p14="http://schemas.microsoft.com/office/powerpoint/2010/main" val="3155697402"/>
+      </p:ext>
+    </p:extLst>
+  </p:cSld>
+  <p:clrMapOvr>
+    <a:masterClrMapping/>
+  </p:clrMapOvr>
+  <p:timing>
+    <p:tnLst>
+      <p:par>
+        <p:cTn id="1" dur="indefinite" restart="never" nodeType="tmRoot"/>
+      </p:par>
+    </p:tnLst>
+  </p:timing>
+</p:sld>
+</file>
+
+<file path=ppt/slides/slide12.xml><?xml version="1.0" encoding="utf-8"?>
+<p:sld xmlns:a="http://schemas.openxmlformats.org/drawingml/2006/main" xmlns:r="http://schemas.openxmlformats.org/officeDocument/2006/relationships" xmlns:p="http://schemas.openxmlformats.org/presentationml/2006/main">
+  <p:cSld>
+    <p:spTree>
+      <p:nvGrpSpPr>
+        <p:cNvPr id="1" name=""/>
+        <p:cNvGrpSpPr/>
+        <p:nvPr/>
+      </p:nvGrpSpPr>
+      <p:grpSpPr>
+        <a:xfrm>
+          <a:off x="0" y="0"/>
+          <a:ext cx="0" cy="0"/>
+          <a:chOff x="0" y="0"/>
+          <a:chExt cx="0" cy="0"/>
+        </a:xfrm>
+      </p:grpSpPr>
+      <p:sp>
+        <p:nvSpPr>
+          <p:cNvPr id="2" name="Title 1"/>
+          <p:cNvSpPr>
+            <a:spLocks noGrp="1"/>
+          </p:cNvSpPr>
+          <p:nvPr>
+            <p:ph type="title"/>
+          </p:nvPr>
+        </p:nvSpPr>
+        <p:spPr/>
+        <p:txBody>
+          <a:bodyPr>
+            <a:normAutofit/>
+          </a:bodyPr>
+          <a:lstStyle/>
+          <a:p>
+            <a:r>
+              <a:rPr lang="en-GB" dirty="0"/>
+              <a:t>Feature Engineering and Size </a:t>
+            </a:r>
+            <a:r>
+              <a:rPr lang="en-GB" dirty="0" smtClean="0"/>
+              <a:t>Impact</a:t>
+            </a:r>
+            <a:endParaRPr lang="en-GB" dirty="0"/>
+          </a:p>
+        </p:txBody>
+      </p:sp>
+      <p:sp>
+        <p:nvSpPr>
+          <p:cNvPr id="3" name="Content Placeholder 2"/>
+          <p:cNvSpPr>
+            <a:spLocks noGrp="1"/>
+          </p:cNvSpPr>
+          <p:nvPr>
+            <p:ph sz="quarter" idx="1"/>
+          </p:nvPr>
+        </p:nvSpPr>
+        <p:spPr/>
+        <p:txBody>
+          <a:bodyPr/>
+          <a:lstStyle/>
+          <a:p>
+            <a:r>
+              <a:rPr lang="en-GB" dirty="0"/>
+              <a:t>Scatterplot for house prices vs. square footage</a:t>
+            </a:r>
           </a:p>
           <a:p>
             <a:endParaRPr lang="en-GB" dirty="0"/>
@@ -6384,7 +6548,7 @@
       </p:sp>
       <p:pic>
         <p:nvPicPr>
-          <p:cNvPr id="5122" name="Picture 2"/>
+          <p:cNvPr id="2050" name="Picture 2"/>
           <p:cNvPicPr>
             <a:picLocks noChangeAspect="1" noChangeArrowheads="1"/>
           </p:cNvPicPr>
@@ -6405,8 +6569,8 @@
         </p:blipFill>
         <p:spPr bwMode="auto">
           <a:xfrm>
-            <a:off x="1475656" y="1988840"/>
-            <a:ext cx="4176464" cy="1681156"/>
+            <a:off x="611560" y="2132856"/>
+            <a:ext cx="6696744" cy="3815688"/>
           </a:xfrm>
           <a:prstGeom prst="rect">
             <a:avLst/>
@@ -6446,16 +6610,148 @@
           </a:extLst>
         </p:spPr>
       </p:pic>
+    </p:spTree>
+    <p:extLst>
+      <p:ext uri="{BB962C8B-B14F-4D97-AF65-F5344CB8AC3E}">
+        <p14:creationId xmlns:p14="http://schemas.microsoft.com/office/powerpoint/2010/main" val="2995126685"/>
+      </p:ext>
+    </p:extLst>
+  </p:cSld>
+  <p:clrMapOvr>
+    <a:masterClrMapping/>
+  </p:clrMapOvr>
+  <p:timing>
+    <p:tnLst>
+      <p:par>
+        <p:cTn id="1" dur="indefinite" restart="never" nodeType="tmRoot"/>
+      </p:par>
+    </p:tnLst>
+  </p:timing>
+</p:sld>
+</file>
+
+<file path=ppt/slides/slide13.xml><?xml version="1.0" encoding="utf-8"?>
+<p:sld xmlns:a="http://schemas.openxmlformats.org/drawingml/2006/main" xmlns:r="http://schemas.openxmlformats.org/officeDocument/2006/relationships" xmlns:p="http://schemas.openxmlformats.org/presentationml/2006/main">
+  <p:cSld>
+    <p:spTree>
+      <p:nvGrpSpPr>
+        <p:cNvPr id="1" name=""/>
+        <p:cNvGrpSpPr/>
+        <p:nvPr/>
+      </p:nvGrpSpPr>
+      <p:grpSpPr>
+        <a:xfrm>
+          <a:off x="0" y="0"/>
+          <a:ext cx="0" cy="0"/>
+          <a:chOff x="0" y="0"/>
+          <a:chExt cx="0" cy="0"/>
+        </a:xfrm>
+      </p:grpSpPr>
+      <p:sp>
+        <p:nvSpPr>
+          <p:cNvPr id="2" name="Title 1"/>
+          <p:cNvSpPr>
+            <a:spLocks noGrp="1"/>
+          </p:cNvSpPr>
+          <p:nvPr>
+            <p:ph type="title"/>
+          </p:nvPr>
+        </p:nvSpPr>
+        <p:spPr/>
+        <p:txBody>
+          <a:bodyPr>
+            <a:noAutofit/>
+          </a:bodyPr>
+          <a:lstStyle/>
+          <a:p>
+            <a:r>
+              <a:rPr lang="en-GB" sz="2400" dirty="0"/>
+              <a:t>Market </a:t>
+            </a:r>
+            <a:r>
+              <a:rPr lang="en-GB" sz="2400" dirty="0" smtClean="0"/>
+              <a:t>Trends, Historical Pricing, </a:t>
+            </a:r>
+            <a:r>
+              <a:rPr lang="en-GB" sz="2400" dirty="0"/>
+              <a:t>Customer Preferences and </a:t>
+            </a:r>
+            <a:r>
+              <a:rPr lang="en-GB" sz="2400" dirty="0" smtClean="0"/>
+              <a:t>Amenities</a:t>
+            </a:r>
+            <a:endParaRPr lang="en-GB" sz="2400" dirty="0"/>
+          </a:p>
+        </p:txBody>
+      </p:sp>
+      <p:sp>
+        <p:nvSpPr>
+          <p:cNvPr id="3" name="Content Placeholder 2"/>
+          <p:cNvSpPr>
+            <a:spLocks noGrp="1"/>
+          </p:cNvSpPr>
+          <p:nvPr>
+            <p:ph sz="quarter" idx="1"/>
+          </p:nvPr>
+        </p:nvSpPr>
+        <p:spPr/>
+        <p:txBody>
+          <a:bodyPr/>
+          <a:lstStyle/>
+          <a:p>
+            <a:r>
+              <a:rPr lang="en-GB" sz="2000" dirty="0"/>
+              <a:t>Line plot for historical pricing </a:t>
+            </a:r>
+            <a:r>
+              <a:rPr lang="en-GB" sz="2000" dirty="0" smtClean="0"/>
+              <a:t>trends.</a:t>
+            </a:r>
+          </a:p>
+          <a:p>
+            <a:endParaRPr lang="en-GB" sz="2000" dirty="0"/>
+          </a:p>
+          <a:p>
+            <a:endParaRPr lang="en-GB" sz="2000" dirty="0" smtClean="0"/>
+          </a:p>
+          <a:p>
+            <a:endParaRPr lang="en-GB" sz="2000" dirty="0"/>
+          </a:p>
+          <a:p>
+            <a:endParaRPr lang="en-GB" sz="2000" dirty="0" smtClean="0"/>
+          </a:p>
+          <a:p>
+            <a:endParaRPr lang="en-GB" sz="2000" dirty="0"/>
+          </a:p>
+          <a:p>
+            <a:r>
+              <a:rPr lang="en-GB" sz="2000" dirty="0"/>
+              <a:t>Boxplot for house prices with/without a </a:t>
+            </a:r>
+            <a:r>
+              <a:rPr lang="en-GB" sz="2000" dirty="0" smtClean="0"/>
+              <a:t>Garage Area.</a:t>
+            </a:r>
+            <a:endParaRPr lang="en-GB" sz="2000" dirty="0"/>
+          </a:p>
+          <a:p>
+            <a:endParaRPr lang="en-GB" sz="2000" dirty="0"/>
+          </a:p>
+          <a:p>
+            <a:endParaRPr lang="en-GB" dirty="0"/>
+          </a:p>
+        </p:txBody>
+      </p:sp>
       <p:pic>
         <p:nvPicPr>
-          <p:cNvPr id="5123" name="Picture 3"/>
+          <p:cNvPr id="5122" name="Picture 2"/>
           <p:cNvPicPr>
             <a:picLocks noChangeAspect="1" noChangeArrowheads="1"/>
           </p:cNvPicPr>
           <p:nvPr/>
         </p:nvPicPr>
         <p:blipFill>
-          <a:blip r:embed="rId3">
+          <a:blip r:embed="rId2">
             <a:extLst>
               <a:ext uri="{28A0092B-C50C-407E-A947-70E740481C1C}">
                 <a14:useLocalDpi xmlns:a14="http://schemas.microsoft.com/office/drawing/2010/main" val="0"/>
@@ -6469,8 +6765,8 @@
         </p:blipFill>
         <p:spPr bwMode="auto">
           <a:xfrm>
-            <a:off x="1259632" y="4149080"/>
-            <a:ext cx="4248472" cy="2088232"/>
+            <a:off x="1475656" y="1988840"/>
+            <a:ext cx="4176464" cy="1681156"/>
           </a:xfrm>
           <a:prstGeom prst="rect">
             <a:avLst/>
@@ -6510,6 +6806,70 @@
           </a:extLst>
         </p:spPr>
       </p:pic>
+      <p:pic>
+        <p:nvPicPr>
+          <p:cNvPr id="3074" name="Picture 2"/>
+          <p:cNvPicPr>
+            <a:picLocks noChangeAspect="1" noChangeArrowheads="1"/>
+          </p:cNvPicPr>
+          <p:nvPr/>
+        </p:nvPicPr>
+        <p:blipFill>
+          <a:blip r:embed="rId3">
+            <a:extLst>
+              <a:ext uri="{28A0092B-C50C-407E-A947-70E740481C1C}">
+                <a14:useLocalDpi xmlns:a14="http://schemas.microsoft.com/office/drawing/2010/main" val="0"/>
+              </a:ext>
+            </a:extLst>
+          </a:blip>
+          <a:srcRect/>
+          <a:stretch>
+            <a:fillRect/>
+          </a:stretch>
+        </p:blipFill>
+        <p:spPr bwMode="auto">
+          <a:xfrm>
+            <a:off x="1187624" y="4077072"/>
+            <a:ext cx="4680520" cy="2376263"/>
+          </a:xfrm>
+          <a:prstGeom prst="rect">
+            <a:avLst/>
+          </a:prstGeom>
+          <a:noFill/>
+          <a:ln>
+            <a:noFill/>
+          </a:ln>
+          <a:effectLst/>
+          <a:extLst>
+            <a:ext uri="{909E8E84-426E-40DD-AFC4-6F175D3DCCD1}">
+              <a14:hiddenFill xmlns:a14="http://schemas.microsoft.com/office/drawing/2010/main">
+                <a:solidFill>
+                  <a:schemeClr val="accent1"/>
+                </a:solidFill>
+              </a14:hiddenFill>
+            </a:ext>
+            <a:ext uri="{91240B29-F687-4F45-9708-019B960494DF}">
+              <a14:hiddenLine xmlns:a14="http://schemas.microsoft.com/office/drawing/2010/main" w="9525">
+                <a:solidFill>
+                  <a:schemeClr val="tx1"/>
+                </a:solidFill>
+                <a:miter lim="800000"/>
+                <a:headEnd/>
+                <a:tailEnd/>
+              </a14:hiddenLine>
+            </a:ext>
+            <a:ext uri="{AF507438-7753-43E0-B8FC-AC1667EBCBE1}">
+              <a14:hiddenEffects xmlns:a14="http://schemas.microsoft.com/office/drawing/2010/main">
+                <a:effectLst>
+                  <a:outerShdw dist="35921" dir="2700000" algn="ctr" rotWithShape="0">
+                    <a:schemeClr val="bg2"/>
+                  </a:outerShdw>
+                </a:effectLst>
+              </a14:hiddenEffects>
+            </a:ext>
+          </a:extLst>
+        </p:spPr>
+      </p:pic>
     </p:spTree>
     <p:extLst>
       <p:ext uri="{BB962C8B-B14F-4D97-AF65-F5344CB8AC3E}">
@@ -6530,7 +6890,340 @@
 </p:sld>
 </file>
 
-<file path=ppt/slides/slide12.xml><?xml version="1.0" encoding="utf-8"?>
+<file path=ppt/slides/slide14.xml><?xml version="1.0" encoding="utf-8"?>
+<p:sld xmlns:a="http://schemas.openxmlformats.org/drawingml/2006/main" xmlns:r="http://schemas.openxmlformats.org/officeDocument/2006/relationships" xmlns:p="http://schemas.openxmlformats.org/presentationml/2006/main">
+  <p:cSld>
+    <p:spTree>
+      <p:nvGrpSpPr>
+        <p:cNvPr id="1" name=""/>
+        <p:cNvGrpSpPr/>
+        <p:nvPr/>
+      </p:nvGrpSpPr>
+      <p:grpSpPr>
+        <a:xfrm>
+          <a:off x="0" y="0"/>
+          <a:ext cx="0" cy="0"/>
+          <a:chOff x="0" y="0"/>
+          <a:chExt cx="0" cy="0"/>
+        </a:xfrm>
+      </p:grpSpPr>
+      <p:sp>
+        <p:nvSpPr>
+          <p:cNvPr id="2" name="Title 1"/>
+          <p:cNvSpPr>
+            <a:spLocks noGrp="1"/>
+          </p:cNvSpPr>
+          <p:nvPr>
+            <p:ph type="title"/>
+          </p:nvPr>
+        </p:nvSpPr>
+        <p:spPr/>
+        <p:txBody>
+          <a:bodyPr>
+            <a:normAutofit/>
+          </a:bodyPr>
+          <a:lstStyle/>
+          <a:p>
+            <a:r>
+              <a:rPr lang="en-GB" dirty="0"/>
+              <a:t>Plot </a:t>
+            </a:r>
+            <a:r>
+              <a:rPr lang="en-GB" dirty="0" err="1"/>
+              <a:t>heatmap</a:t>
+            </a:r>
+            <a:r>
+              <a:rPr lang="en-GB" dirty="0"/>
+              <a:t> of correlation </a:t>
+            </a:r>
+            <a:r>
+              <a:rPr lang="en-GB" dirty="0" smtClean="0"/>
+              <a:t>matrix</a:t>
+            </a:r>
+            <a:endParaRPr lang="en-GB" dirty="0"/>
+          </a:p>
+        </p:txBody>
+      </p:sp>
+      <p:sp>
+        <p:nvSpPr>
+          <p:cNvPr id="3" name="Content Placeholder 2"/>
+          <p:cNvSpPr>
+            <a:spLocks noGrp="1"/>
+          </p:cNvSpPr>
+          <p:nvPr>
+            <p:ph sz="quarter" idx="1"/>
+          </p:nvPr>
+        </p:nvSpPr>
+        <p:spPr/>
+        <p:txBody>
+          <a:bodyPr/>
+          <a:lstStyle/>
+          <a:p>
+            <a:r>
+              <a:rPr lang="en-GB" dirty="0" smtClean="0"/>
+              <a:t>Calculate </a:t>
+            </a:r>
+            <a:r>
+              <a:rPr lang="en-GB" dirty="0"/>
+              <a:t>correlation </a:t>
+            </a:r>
+            <a:r>
+              <a:rPr lang="en-GB" dirty="0" smtClean="0"/>
+              <a:t>matrix and plot </a:t>
+            </a:r>
+            <a:r>
+              <a:rPr lang="en-GB" dirty="0" err="1" smtClean="0"/>
+              <a:t>heatmap</a:t>
+            </a:r>
+            <a:endParaRPr lang="en-GB" dirty="0"/>
+          </a:p>
+          <a:p>
+            <a:endParaRPr lang="en-GB" dirty="0"/>
+          </a:p>
+        </p:txBody>
+      </p:sp>
+      <p:pic>
+        <p:nvPicPr>
+          <p:cNvPr id="6146" name="Picture 2"/>
+          <p:cNvPicPr>
+            <a:picLocks noChangeAspect="1" noChangeArrowheads="1"/>
+          </p:cNvPicPr>
+          <p:nvPr/>
+        </p:nvPicPr>
+        <p:blipFill>
+          <a:blip r:embed="rId2">
+            <a:extLst>
+              <a:ext uri="{28A0092B-C50C-407E-A947-70E740481C1C}">
+                <a14:useLocalDpi xmlns:a14="http://schemas.microsoft.com/office/drawing/2010/main" val="0"/>
+              </a:ext>
+            </a:extLst>
+          </a:blip>
+          <a:srcRect/>
+          <a:stretch>
+            <a:fillRect/>
+          </a:stretch>
+        </p:blipFill>
+        <p:spPr bwMode="auto">
+          <a:xfrm>
+            <a:off x="611560" y="2132856"/>
+            <a:ext cx="7128792" cy="3686175"/>
+          </a:xfrm>
+          <a:prstGeom prst="rect">
+            <a:avLst/>
+          </a:prstGeom>
+          <a:noFill/>
+          <a:ln>
+            <a:noFill/>
+          </a:ln>
+          <a:effectLst/>
+          <a:extLst>
+            <a:ext uri="{909E8E84-426E-40DD-AFC4-6F175D3DCCD1}">
+              <a14:hiddenFill xmlns:a14="http://schemas.microsoft.com/office/drawing/2010/main">
+                <a:solidFill>
+                  <a:schemeClr val="accent1"/>
+                </a:solidFill>
+              </a14:hiddenFill>
+            </a:ext>
+            <a:ext uri="{91240B29-F687-4F45-9708-019B960494DF}">
+              <a14:hiddenLine xmlns:a14="http://schemas.microsoft.com/office/drawing/2010/main" w="9525">
+                <a:solidFill>
+                  <a:schemeClr val="tx1"/>
+                </a:solidFill>
+                <a:miter lim="800000"/>
+                <a:headEnd/>
+                <a:tailEnd/>
+              </a14:hiddenLine>
+            </a:ext>
+            <a:ext uri="{AF507438-7753-43E0-B8FC-AC1667EBCBE1}">
+              <a14:hiddenEffects xmlns:a14="http://schemas.microsoft.com/office/drawing/2010/main">
+                <a:effectLst>
+                  <a:outerShdw dist="35921" dir="2700000" algn="ctr" rotWithShape="0">
+                    <a:schemeClr val="bg2"/>
+                  </a:outerShdw>
+                </a:effectLst>
+              </a14:hiddenEffects>
+            </a:ext>
+          </a:extLst>
+        </p:spPr>
+      </p:pic>
+    </p:spTree>
+    <p:extLst>
+      <p:ext uri="{BB962C8B-B14F-4D97-AF65-F5344CB8AC3E}">
+        <p14:creationId xmlns:p14="http://schemas.microsoft.com/office/powerpoint/2010/main" val="2630412810"/>
+      </p:ext>
+    </p:extLst>
+  </p:cSld>
+  <p:clrMapOvr>
+    <a:masterClrMapping/>
+  </p:clrMapOvr>
+</p:sld>
+</file>
+
+<file path=ppt/slides/slide15.xml><?xml version="1.0" encoding="utf-8"?>
+<p:sld xmlns:a="http://schemas.openxmlformats.org/drawingml/2006/main" xmlns:r="http://schemas.openxmlformats.org/officeDocument/2006/relationships" xmlns:p="http://schemas.openxmlformats.org/presentationml/2006/main">
+  <p:cSld>
+    <p:spTree>
+      <p:nvGrpSpPr>
+        <p:cNvPr id="1" name=""/>
+        <p:cNvGrpSpPr/>
+        <p:nvPr/>
+      </p:nvGrpSpPr>
+      <p:grpSpPr>
+        <a:xfrm>
+          <a:off x="0" y="0"/>
+          <a:ext cx="0" cy="0"/>
+          <a:chOff x="0" y="0"/>
+          <a:chExt cx="0" cy="0"/>
+        </a:xfrm>
+      </p:grpSpPr>
+      <p:sp>
+        <p:nvSpPr>
+          <p:cNvPr id="2" name="Title 1"/>
+          <p:cNvSpPr>
+            <a:spLocks noGrp="1"/>
+          </p:cNvSpPr>
+          <p:nvPr>
+            <p:ph type="title"/>
+          </p:nvPr>
+        </p:nvSpPr>
+        <p:spPr/>
+        <p:txBody>
+          <a:bodyPr>
+            <a:normAutofit/>
+          </a:bodyPr>
+          <a:lstStyle/>
+          <a:p>
+            <a:r>
+              <a:rPr lang="en-GB" dirty="0"/>
+              <a:t>Create a bar plot using </a:t>
+            </a:r>
+            <a:r>
+              <a:rPr lang="en-GB" dirty="0" err="1" smtClean="0"/>
+              <a:t>Seaborn</a:t>
+            </a:r>
+            <a:endParaRPr lang="en-GB" dirty="0"/>
+          </a:p>
+        </p:txBody>
+      </p:sp>
+      <p:sp>
+        <p:nvSpPr>
+          <p:cNvPr id="3" name="Content Placeholder 2"/>
+          <p:cNvSpPr>
+            <a:spLocks noGrp="1"/>
+          </p:cNvSpPr>
+          <p:nvPr>
+            <p:ph sz="quarter" idx="1"/>
+          </p:nvPr>
+        </p:nvSpPr>
+        <p:spPr/>
+        <p:txBody>
+          <a:bodyPr/>
+          <a:lstStyle/>
+          <a:p>
+            <a:r>
+              <a:rPr lang="en-GB" dirty="0"/>
+              <a:t>Specify the categorical column to </a:t>
+            </a:r>
+            <a:r>
+              <a:rPr lang="en-GB" dirty="0" smtClean="0"/>
+              <a:t>plot and adjust the </a:t>
+            </a:r>
+            <a:r>
+              <a:rPr lang="en-GB" dirty="0"/>
+              <a:t>x-axis labels for </a:t>
+            </a:r>
+            <a:r>
+              <a:rPr lang="en-GB" dirty="0" smtClean="0"/>
+              <a:t>better readability. </a:t>
+            </a:r>
+            <a:endParaRPr lang="en-GB" dirty="0"/>
+          </a:p>
+          <a:p>
+            <a:endParaRPr lang="en-GB" dirty="0"/>
+          </a:p>
+          <a:p>
+            <a:endParaRPr lang="en-GB" dirty="0"/>
+          </a:p>
+        </p:txBody>
+      </p:sp>
+      <p:pic>
+        <p:nvPicPr>
+          <p:cNvPr id="7170" name="Picture 2"/>
+          <p:cNvPicPr>
+            <a:picLocks noChangeAspect="1" noChangeArrowheads="1"/>
+          </p:cNvPicPr>
+          <p:nvPr/>
+        </p:nvPicPr>
+        <p:blipFill>
+          <a:blip r:embed="rId2">
+            <a:extLst>
+              <a:ext uri="{28A0092B-C50C-407E-A947-70E740481C1C}">
+                <a14:useLocalDpi xmlns:a14="http://schemas.microsoft.com/office/drawing/2010/main" val="0"/>
+              </a:ext>
+            </a:extLst>
+          </a:blip>
+          <a:srcRect/>
+          <a:stretch>
+            <a:fillRect/>
+          </a:stretch>
+        </p:blipFill>
+        <p:spPr bwMode="auto">
+          <a:xfrm>
+            <a:off x="539552" y="2420888"/>
+            <a:ext cx="7848872" cy="3816423"/>
+          </a:xfrm>
+          <a:prstGeom prst="rect">
+            <a:avLst/>
+          </a:prstGeom>
+          <a:noFill/>
+          <a:ln>
+            <a:noFill/>
+          </a:ln>
+          <a:effectLst/>
+          <a:extLst>
+            <a:ext uri="{909E8E84-426E-40DD-AFC4-6F175D3DCCD1}">
+              <a14:hiddenFill xmlns:a14="http://schemas.microsoft.com/office/drawing/2010/main">
+                <a:solidFill>
+                  <a:schemeClr val="accent1"/>
+                </a:solidFill>
+              </a14:hiddenFill>
+            </a:ext>
+            <a:ext uri="{91240B29-F687-4F45-9708-019B960494DF}">
+              <a14:hiddenLine xmlns:a14="http://schemas.microsoft.com/office/drawing/2010/main" w="9525">
+                <a:solidFill>
+                  <a:schemeClr val="tx1"/>
+                </a:solidFill>
+                <a:miter lim="800000"/>
+                <a:headEnd/>
+                <a:tailEnd/>
+              </a14:hiddenLine>
+            </a:ext>
+            <a:ext uri="{AF507438-7753-43E0-B8FC-AC1667EBCBE1}">
+              <a14:hiddenEffects xmlns:a14="http://schemas.microsoft.com/office/drawing/2010/main">
+                <a:effectLst>
+                  <a:outerShdw dist="35921" dir="2700000" algn="ctr" rotWithShape="0">
+                    <a:schemeClr val="bg2"/>
+                  </a:outerShdw>
+                </a:effectLst>
+              </a14:hiddenEffects>
+            </a:ext>
+          </a:extLst>
+        </p:spPr>
+      </p:pic>
+    </p:spTree>
+    <p:extLst>
+      <p:ext uri="{BB962C8B-B14F-4D97-AF65-F5344CB8AC3E}">
+        <p14:creationId xmlns:p14="http://schemas.microsoft.com/office/powerpoint/2010/main" val="3732333253"/>
+      </p:ext>
+    </p:extLst>
+  </p:cSld>
+  <p:clrMapOvr>
+    <a:masterClrMapping/>
+  </p:clrMapOvr>
+</p:sld>
+</file>
+
+<file path=ppt/slides/slide16.xml><?xml version="1.0" encoding="utf-8"?>
 <p:sld xmlns:a="http://schemas.openxmlformats.org/drawingml/2006/main" xmlns:r="http://schemas.openxmlformats.org/officeDocument/2006/relationships" xmlns:p="http://schemas.openxmlformats.org/presentationml/2006/main">
   <p:cSld>
     <p:spTree>
@@ -7355,94 +8048,65 @@
         </p:nvSpPr>
         <p:spPr/>
         <p:txBody>
-          <a:bodyPr/>
-          <a:lstStyle/>
-          <a:p>
-            <a:r>
-              <a:rPr lang="en-GB" dirty="0"/>
-              <a:t>Cleaning the Data</a:t>
-            </a:r>
-          </a:p>
-        </p:txBody>
-      </p:sp>
-      <p:sp>
-        <p:nvSpPr>
-          <p:cNvPr id="3" name="Content Placeholder 2"/>
-          <p:cNvSpPr>
-            <a:spLocks noGrp="1"/>
-          </p:cNvSpPr>
-          <p:nvPr>
-            <p:ph sz="quarter" idx="1"/>
-          </p:nvPr>
-        </p:nvSpPr>
-        <p:spPr/>
-        <p:txBody>
           <a:bodyPr>
             <a:normAutofit/>
           </a:bodyPr>
           <a:lstStyle/>
           <a:p>
             <a:r>
-              <a:rPr lang="en-GB" sz="2000" dirty="0"/>
-              <a:t>Handling missing values by filling null </a:t>
-            </a:r>
-            <a:r>
-              <a:rPr lang="en-GB" sz="2000" dirty="0" smtClean="0"/>
-              <a:t>values.</a:t>
-            </a:r>
-          </a:p>
-          <a:p>
-            <a:pPr marL="514350" indent="-514350">
-              <a:buFont typeface="+mj-lt"/>
-              <a:buAutoNum type="arabicPeriod"/>
-            </a:pPr>
-            <a:r>
-              <a:rPr lang="en-GB" sz="2000" dirty="0"/>
-              <a:t>Filling missing values in numerical columns with the mean</a:t>
-            </a:r>
-          </a:p>
-          <a:p>
-            <a:pPr marL="514350" indent="-514350">
-              <a:buFont typeface="+mj-lt"/>
-              <a:buAutoNum type="arabicPeriod"/>
-            </a:pPr>
-            <a:r>
-              <a:rPr lang="en-GB" sz="2000" dirty="0"/>
-              <a:t>Filling missing values in object columns with the </a:t>
-            </a:r>
-            <a:r>
-              <a:rPr lang="en-GB" sz="2000" dirty="0" smtClean="0"/>
-              <a:t>mode.</a:t>
-            </a:r>
-          </a:p>
-          <a:p>
-            <a:r>
-              <a:rPr lang="en-GB" sz="2000" dirty="0"/>
-              <a:t>Univariate </a:t>
-            </a:r>
-            <a:r>
-              <a:rPr lang="en-GB" sz="2000" dirty="0" smtClean="0"/>
-              <a:t>Analysis:- Histogram </a:t>
-            </a:r>
-            <a:r>
-              <a:rPr lang="en-GB" sz="2000" dirty="0"/>
-              <a:t>for house prices</a:t>
-            </a:r>
-          </a:p>
-          <a:p>
-            <a:endParaRPr lang="en-GB" sz="2000" dirty="0"/>
-          </a:p>
-          <a:p>
-            <a:endParaRPr lang="en-GB" sz="2000" dirty="0"/>
-          </a:p>
-          <a:p>
-            <a:endParaRPr lang="en-GB" sz="2000" dirty="0"/>
+              <a:rPr lang="en-GB" sz="3000" dirty="0"/>
+              <a:t>Visualize distributions of numerical </a:t>
+            </a:r>
+            <a:r>
+              <a:rPr lang="en-GB" sz="3000" dirty="0" smtClean="0"/>
+              <a:t>features</a:t>
+            </a:r>
+            <a:endParaRPr lang="en-GB" sz="3000" b="1" dirty="0"/>
+          </a:p>
+        </p:txBody>
+      </p:sp>
+      <p:sp>
+        <p:nvSpPr>
+          <p:cNvPr id="3" name="Content Placeholder 2"/>
+          <p:cNvSpPr>
+            <a:spLocks noGrp="1"/>
+          </p:cNvSpPr>
+          <p:nvPr>
+            <p:ph sz="quarter" idx="1"/>
+          </p:nvPr>
+        </p:nvSpPr>
+        <p:spPr/>
+        <p:txBody>
+          <a:bodyPr>
+            <a:normAutofit/>
+          </a:bodyPr>
+          <a:lstStyle/>
+          <a:p>
+            <a:r>
+              <a:rPr lang="en-GB" sz="1400" dirty="0"/>
+              <a:t>Visualize the distributions of numerical features using histograms or kernel density plots to understand their </a:t>
+            </a:r>
+            <a:r>
+              <a:rPr lang="en-GB" sz="1400" dirty="0" smtClean="0"/>
+              <a:t>spread </a:t>
+            </a:r>
+            <a:r>
+              <a:rPr lang="en-GB" sz="1400" dirty="0"/>
+              <a:t>and central tendency</a:t>
+            </a:r>
+            <a:r>
+              <a:rPr lang="en-GB" sz="1400" dirty="0" smtClean="0"/>
+              <a:t>.</a:t>
+            </a:r>
+          </a:p>
+          <a:p>
+            <a:endParaRPr lang="en-GB" sz="1400" dirty="0"/>
           </a:p>
         </p:txBody>
       </p:sp>
       <p:pic>
         <p:nvPicPr>
-          <p:cNvPr id="2050" name="Picture 2"/>
+          <p:cNvPr id="4099" name="Picture 3"/>
           <p:cNvPicPr>
             <a:picLocks noChangeAspect="1" noChangeArrowheads="1"/>
           </p:cNvPicPr>
@@ -7463,8 +8127,8 @@
         </p:blipFill>
         <p:spPr bwMode="auto">
           <a:xfrm>
-            <a:off x="899592" y="3212976"/>
-            <a:ext cx="5616624" cy="3215432"/>
+            <a:off x="395536" y="2060848"/>
+            <a:ext cx="8352928" cy="4248472"/>
           </a:xfrm>
           <a:prstGeom prst="rect">
             <a:avLst/>
@@ -7507,20 +8171,13 @@
     </p:spTree>
     <p:extLst>
       <p:ext uri="{BB962C8B-B14F-4D97-AF65-F5344CB8AC3E}">
-        <p14:creationId xmlns:p14="http://schemas.microsoft.com/office/powerpoint/2010/main" val="2230046348"/>
+        <p14:creationId xmlns:p14="http://schemas.microsoft.com/office/powerpoint/2010/main" val="3499953932"/>
       </p:ext>
     </p:extLst>
   </p:cSld>
   <p:clrMapOvr>
     <a:masterClrMapping/>
   </p:clrMapOvr>
-  <p:timing>
-    <p:tnLst>
-      <p:par>
-        <p:cTn id="1" dur="indefinite" restart="never" nodeType="tmRoot"/>
-      </p:par>
-    </p:tnLst>
-  </p:timing>
 </p:sld>
 </file>
 
@@ -7559,14 +8216,14 @@
           <a:lstStyle/>
           <a:p>
             <a:r>
-              <a:rPr lang="en-GB" sz="3200" dirty="0"/>
-              <a:t>Multivariate </a:t>
-            </a:r>
-            <a:r>
-              <a:rPr lang="en-GB" sz="3200" dirty="0" smtClean="0"/>
-              <a:t>Analysis</a:t>
-            </a:r>
-            <a:endParaRPr lang="en-GB" sz="3200" dirty="0"/>
+              <a:rPr lang="en-GB" dirty="0"/>
+              <a:t>Create a box plot using </a:t>
+            </a:r>
+            <a:r>
+              <a:rPr lang="en-GB" dirty="0" err="1" smtClean="0"/>
+              <a:t>Matplotlib</a:t>
+            </a:r>
+            <a:endParaRPr lang="en-GB" dirty="0"/>
           </a:p>
         </p:txBody>
       </p:sp>
@@ -7582,68 +8239,30 @@
         </p:nvSpPr>
         <p:spPr/>
         <p:txBody>
-          <a:bodyPr>
-            <a:normAutofit/>
-          </a:bodyPr>
-          <a:lstStyle/>
-          <a:p>
-            <a:r>
-              <a:rPr lang="en-GB" sz="2000" dirty="0" smtClean="0"/>
-              <a:t>Scatterplot </a:t>
-            </a:r>
-            <a:r>
-              <a:rPr lang="en-GB" sz="2000" dirty="0"/>
-              <a:t>matrix for selected </a:t>
-            </a:r>
-            <a:r>
-              <a:rPr lang="en-GB" sz="2000" dirty="0" smtClean="0"/>
-              <a:t>features:- </a:t>
-            </a:r>
-            <a:r>
-              <a:rPr lang="en-GB" sz="2000" dirty="0"/>
-              <a:t>'</a:t>
-            </a:r>
-            <a:r>
-              <a:rPr lang="en-GB" sz="2000" dirty="0" err="1"/>
-              <a:t>SalePrice</a:t>
-            </a:r>
-            <a:r>
-              <a:rPr lang="en-GB" sz="2000" dirty="0"/>
-              <a:t>', '</a:t>
-            </a:r>
-            <a:r>
-              <a:rPr lang="en-GB" sz="2000" dirty="0" err="1"/>
-              <a:t>GarageArea</a:t>
-            </a:r>
-            <a:r>
-              <a:rPr lang="en-GB" sz="2000" dirty="0"/>
-              <a:t>', '</a:t>
-            </a:r>
-            <a:r>
-              <a:rPr lang="en-GB" sz="2000" dirty="0" err="1"/>
-              <a:t>TotRmsAbvGrd</a:t>
-            </a:r>
-            <a:r>
-              <a:rPr lang="en-GB" sz="2000" dirty="0"/>
-              <a:t>', '</a:t>
-            </a:r>
-            <a:r>
-              <a:rPr lang="en-GB" sz="2000" dirty="0" err="1"/>
-              <a:t>GrLivArea</a:t>
-            </a:r>
-            <a:r>
-              <a:rPr lang="en-GB" sz="2000" dirty="0"/>
-              <a:t>'</a:t>
-            </a:r>
-          </a:p>
-          <a:p>
-            <a:endParaRPr lang="en-GB" sz="2000" dirty="0"/>
+          <a:bodyPr/>
+          <a:lstStyle/>
+          <a:p>
+            <a:r>
+              <a:rPr lang="en-GB" dirty="0"/>
+              <a:t>Specify the </a:t>
+            </a:r>
+            <a:r>
+              <a:rPr lang="en-GB" dirty="0" smtClean="0"/>
+              <a:t>five </a:t>
+            </a:r>
+            <a:r>
+              <a:rPr lang="en-GB" dirty="0"/>
+              <a:t>numerical columns to plot</a:t>
+            </a:r>
+          </a:p>
+          <a:p>
+            <a:endParaRPr lang="en-GB" dirty="0"/>
           </a:p>
         </p:txBody>
       </p:sp>
       <p:pic>
         <p:nvPicPr>
-          <p:cNvPr id="3074" name="Picture 2"/>
+          <p:cNvPr id="5122" name="Picture 2"/>
           <p:cNvPicPr>
             <a:picLocks noChangeAspect="1" noChangeArrowheads="1"/>
           </p:cNvPicPr>
@@ -7664,8 +8283,8 @@
         </p:blipFill>
         <p:spPr bwMode="auto">
           <a:xfrm>
-            <a:off x="528788" y="2276872"/>
-            <a:ext cx="8070331" cy="3960440"/>
+            <a:off x="611560" y="2348880"/>
+            <a:ext cx="5391150" cy="3562350"/>
           </a:xfrm>
           <a:prstGeom prst="rect">
             <a:avLst/>
@@ -7708,20 +8327,13 @@
     </p:spTree>
     <p:extLst>
       <p:ext uri="{BB962C8B-B14F-4D97-AF65-F5344CB8AC3E}">
-        <p14:creationId xmlns:p14="http://schemas.microsoft.com/office/powerpoint/2010/main" val="4049109071"/>
+        <p14:creationId xmlns:p14="http://schemas.microsoft.com/office/powerpoint/2010/main" val="1215084748"/>
       </p:ext>
     </p:extLst>
   </p:cSld>
   <p:clrMapOvr>
     <a:masterClrMapping/>
   </p:clrMapOvr>
-  <p:timing>
-    <p:tnLst>
-      <p:par>
-        <p:cTn id="1" dur="indefinite" restart="never" nodeType="tmRoot"/>
-      </p:par>
-    </p:tnLst>
-  </p:timing>
 </p:sld>
 </file>
 
@@ -7754,116 +8366,159 @@
         </p:nvSpPr>
         <p:spPr/>
         <p:txBody>
+          <a:bodyPr/>
+          <a:lstStyle/>
+          <a:p>
+            <a:r>
+              <a:rPr lang="en-GB" dirty="0"/>
+              <a:t>Cleaning the Data</a:t>
+            </a:r>
+          </a:p>
+        </p:txBody>
+      </p:sp>
+      <p:sp>
+        <p:nvSpPr>
+          <p:cNvPr id="3" name="Content Placeholder 2"/>
+          <p:cNvSpPr>
+            <a:spLocks noGrp="1"/>
+          </p:cNvSpPr>
+          <p:nvPr>
+            <p:ph sz="quarter" idx="1"/>
+          </p:nvPr>
+        </p:nvSpPr>
+        <p:spPr/>
+        <p:txBody>
           <a:bodyPr>
             <a:normAutofit/>
           </a:bodyPr>
           <a:lstStyle/>
           <a:p>
             <a:r>
-              <a:rPr lang="en-GB" sz="3000" dirty="0"/>
-              <a:t>Feature </a:t>
-            </a:r>
-            <a:r>
-              <a:rPr lang="en-GB" sz="3000" dirty="0" smtClean="0"/>
-              <a:t>Engineering and </a:t>
-            </a:r>
-            <a:r>
-              <a:rPr lang="en-GB" sz="3000" dirty="0"/>
-              <a:t>Geospatial </a:t>
-            </a:r>
-            <a:r>
-              <a:rPr lang="en-GB" sz="3000" dirty="0" smtClean="0"/>
-              <a:t>Analysis</a:t>
-            </a:r>
-            <a:endParaRPr lang="en-GB" sz="3000" dirty="0"/>
-          </a:p>
-        </p:txBody>
-      </p:sp>
-      <p:sp>
-        <p:nvSpPr>
-          <p:cNvPr id="3" name="Content Placeholder 2"/>
-          <p:cNvSpPr>
-            <a:spLocks noGrp="1"/>
-          </p:cNvSpPr>
-          <p:nvPr>
-            <p:ph sz="quarter" idx="1"/>
-          </p:nvPr>
-        </p:nvSpPr>
-        <p:spPr/>
-        <p:txBody>
-          <a:bodyPr/>
-          <a:lstStyle/>
-          <a:p>
-            <a:r>
-              <a:rPr lang="en-GB" dirty="0"/>
-              <a:t>Create a new feature </a:t>
-            </a:r>
-            <a:r>
-              <a:rPr lang="en-GB" dirty="0" smtClean="0"/>
-              <a:t>“</a:t>
-            </a:r>
-            <a:r>
-              <a:rPr lang="en-GB" dirty="0" err="1" smtClean="0"/>
-              <a:t>price_per_sqft</a:t>
-            </a:r>
-            <a:r>
-              <a:rPr lang="en-GB" dirty="0" smtClean="0"/>
-              <a:t>” by using two feature data (</a:t>
-            </a:r>
-            <a:r>
-              <a:rPr lang="en-GB" dirty="0" err="1" smtClean="0"/>
-              <a:t>SalePrice</a:t>
-            </a:r>
-            <a:r>
-              <a:rPr lang="en-GB" dirty="0" smtClean="0"/>
-              <a:t> and </a:t>
-            </a:r>
-            <a:r>
-              <a:rPr lang="en-GB" dirty="0" err="1" smtClean="0"/>
-              <a:t>GrLivArea</a:t>
-            </a:r>
-            <a:r>
-              <a:rPr lang="en-GB" dirty="0" smtClean="0"/>
-              <a:t>).</a:t>
-            </a:r>
-          </a:p>
-          <a:p>
-            <a:pPr marL="0" indent="0">
-              <a:buNone/>
+              <a:rPr lang="en-GB" sz="2000" dirty="0"/>
+              <a:t>Handling missing values by filling null </a:t>
+            </a:r>
+            <a:r>
+              <a:rPr lang="en-GB" sz="2000" dirty="0" smtClean="0"/>
+              <a:t>values.</a:t>
+            </a:r>
+          </a:p>
+          <a:p>
+            <a:pPr marL="514350" indent="-514350">
+              <a:buFont typeface="+mj-lt"/>
+              <a:buAutoNum type="arabicPeriod"/>
             </a:pPr>
-            <a:endParaRPr lang="en-GB" dirty="0"/>
-          </a:p>
-          <a:p>
-            <a:pPr marL="0" indent="0">
-              <a:buNone/>
+            <a:r>
+              <a:rPr lang="en-GB" sz="2000" dirty="0"/>
+              <a:t>Filling missing values in numerical columns with the mean</a:t>
+            </a:r>
+          </a:p>
+          <a:p>
+            <a:pPr marL="514350" indent="-514350">
+              <a:buFont typeface="+mj-lt"/>
+              <a:buAutoNum type="arabicPeriod"/>
             </a:pPr>
-            <a:endParaRPr lang="en-GB" dirty="0" smtClean="0"/>
-          </a:p>
-          <a:p>
-            <a:r>
-              <a:rPr lang="en-GB" dirty="0"/>
-              <a:t>Geospatial </a:t>
-            </a:r>
-            <a:r>
-              <a:rPr lang="en-GB" dirty="0" smtClean="0"/>
-              <a:t>Analysis:-  For this we need longitude and latitude so we can analysis the data accordingly. </a:t>
-            </a:r>
-          </a:p>
-          <a:p>
-            <a:endParaRPr lang="en-GB" dirty="0"/>
-          </a:p>
-          <a:p>
-            <a:endParaRPr lang="en-GB" dirty="0" smtClean="0"/>
-          </a:p>
-          <a:p>
-            <a:endParaRPr lang="en-GB" dirty="0"/>
-          </a:p>
-        </p:txBody>
-      </p:sp>
+            <a:r>
+              <a:rPr lang="en-GB" sz="2000" dirty="0"/>
+              <a:t>Filling missing values in object columns with the </a:t>
+            </a:r>
+            <a:r>
+              <a:rPr lang="en-GB" sz="2000" dirty="0" smtClean="0"/>
+              <a:t>mode.</a:t>
+            </a:r>
+          </a:p>
+          <a:p>
+            <a:r>
+              <a:rPr lang="en-GB" sz="2000" dirty="0"/>
+              <a:t>Univariate </a:t>
+            </a:r>
+            <a:r>
+              <a:rPr lang="en-GB" sz="2000" dirty="0" smtClean="0"/>
+              <a:t>Analysis:- Histogram </a:t>
+            </a:r>
+            <a:r>
+              <a:rPr lang="en-GB" sz="2000" dirty="0"/>
+              <a:t>for house prices</a:t>
+            </a:r>
+          </a:p>
+          <a:p>
+            <a:endParaRPr lang="en-GB" sz="2000" dirty="0"/>
+          </a:p>
+          <a:p>
+            <a:endParaRPr lang="en-GB" sz="2000" dirty="0"/>
+          </a:p>
+          <a:p>
+            <a:endParaRPr lang="en-GB" sz="2000" dirty="0"/>
+          </a:p>
+        </p:txBody>
+      </p:sp>
+      <p:pic>
+        <p:nvPicPr>
+          <p:cNvPr id="2050" name="Picture 2"/>
+          <p:cNvPicPr>
+            <a:picLocks noChangeAspect="1" noChangeArrowheads="1"/>
+          </p:cNvPicPr>
+          <p:nvPr/>
+        </p:nvPicPr>
+        <p:blipFill>
+          <a:blip r:embed="rId2">
+            <a:extLst>
+              <a:ext uri="{28A0092B-C50C-407E-A947-70E740481C1C}">
+                <a14:useLocalDpi xmlns:a14="http://schemas.microsoft.com/office/drawing/2010/main" val="0"/>
+              </a:ext>
+            </a:extLst>
+          </a:blip>
+          <a:srcRect/>
+          <a:stretch>
+            <a:fillRect/>
+          </a:stretch>
+        </p:blipFill>
+        <p:spPr bwMode="auto">
+          <a:xfrm>
+            <a:off x="899592" y="3212976"/>
+            <a:ext cx="5616624" cy="3215432"/>
+          </a:xfrm>
+          <a:prstGeom prst="rect">
+            <a:avLst/>
+          </a:prstGeom>
+          <a:noFill/>
+          <a:ln>
+            <a:noFill/>
+          </a:ln>
+          <a:effectLst/>
+          <a:extLst>
+            <a:ext uri="{909E8E84-426E-40DD-AFC4-6F175D3DCCD1}">
+              <a14:hiddenFill xmlns:a14="http://schemas.microsoft.com/office/drawing/2010/main">
+                <a:solidFill>
+                  <a:schemeClr val="accent1"/>
+                </a:solidFill>
+              </a14:hiddenFill>
+            </a:ext>
+            <a:ext uri="{91240B29-F687-4F45-9708-019B960494DF}">
+              <a14:hiddenLine xmlns:a14="http://schemas.microsoft.com/office/drawing/2010/main" w="9525">
+                <a:solidFill>
+                  <a:schemeClr val="tx1"/>
+                </a:solidFill>
+                <a:miter lim="800000"/>
+                <a:headEnd/>
+                <a:tailEnd/>
+              </a14:hiddenLine>
+            </a:ext>
+            <a:ext uri="{AF507438-7753-43E0-B8FC-AC1667EBCBE1}">
+              <a14:hiddenEffects xmlns:a14="http://schemas.microsoft.com/office/drawing/2010/main">
+                <a:effectLst>
+                  <a:outerShdw dist="35921" dir="2700000" algn="ctr" rotWithShape="0">
+                    <a:schemeClr val="bg2"/>
+                  </a:outerShdw>
+                </a:effectLst>
+              </a14:hiddenEffects>
+            </a:ext>
+          </a:extLst>
+        </p:spPr>
+      </p:pic>
     </p:spTree>
     <p:extLst>
       <p:ext uri="{BB962C8B-B14F-4D97-AF65-F5344CB8AC3E}">
-        <p14:creationId xmlns:p14="http://schemas.microsoft.com/office/powerpoint/2010/main" val="3155697402"/>
+        <p14:creationId xmlns:p14="http://schemas.microsoft.com/office/powerpoint/2010/main" val="2230046348"/>
       </p:ext>
     </p:extLst>
   </p:cSld>

</xml_diff>